<commit_message>
Atualização dos slides sobre Layouts
</commit_message>
<xml_diff>
--- a/Módulo VI - Layouts no Flutter​/Módulo VI - Layouts no Flutter.pptx
+++ b/Módulo VI - Layouts no Flutter​/Módulo VI - Layouts no Flutter.pptx
@@ -35,20 +35,13 @@
       <p:bold r:id="rId20"/>
     </p:embeddedFont>
     <p:embeddedFont>
-      <p:font typeface="Poppins" panose="00000500000000000000" pitchFamily="2" charset="0"/>
+      <p:font typeface="Poppins Bold" panose="00000800000000000000" pitchFamily="2" charset="0"/>
       <p:regular r:id="rId21"/>
       <p:bold r:id="rId22"/>
-      <p:italic r:id="rId23"/>
-      <p:boldItalic r:id="rId24"/>
-    </p:embeddedFont>
-    <p:embeddedFont>
-      <p:font typeface="Poppins Bold" panose="00000800000000000000" pitchFamily="2" charset="0"/>
-      <p:regular r:id="rId25"/>
-      <p:bold r:id="rId26"/>
     </p:embeddedFont>
     <p:embeddedFont>
       <p:font typeface="Poppins Ultra-Bold" panose="020B0604020202020204" charset="0"/>
-      <p:regular r:id="rId27"/>
+      <p:regular r:id="rId23"/>
     </p:embeddedFont>
   </p:embeddedFontLst>
   <p:defaultTextStyle>
@@ -168,6 +161,7 @@
 <file path=ppt/revisionInfo.xml><?xml version="1.0" encoding="utf-8"?>
 <p1510:revInfo xmlns:a="http://schemas.openxmlformats.org/drawingml/2006/main" xmlns:r="http://schemas.openxmlformats.org/officeDocument/2006/relationships" xmlns:p1510="http://schemas.microsoft.com/office/powerpoint/2015/10/main">
   <p1510:revLst>
+    <p1510:client id="{2BDF7A93-7A63-AA3D-7F81-8B8631D87EB9}" v="120" dt="2024-11-21T22:25:44.783"/>
     <p1510:client id="{E2FE2D77-F8B9-16FC-99DC-0EE65FFF50A4}" v="496" dt="2024-11-21T21:49:22.464"/>
     <p1510:client id="{EED81E3E-F9E1-B625-B64B-9AE31159CABD}" v="229" dt="2024-11-21T01:28:19.948"/>
   </p1510:revLst>
@@ -3316,8 +3310,8 @@
         </p:nvSpPr>
         <p:spPr>
           <a:xfrm>
-            <a:off x="785151" y="4571985"/>
-            <a:ext cx="12859928" cy="1181130"/>
+            <a:off x="785151" y="3707012"/>
+            <a:ext cx="12859928" cy="2172390"/>
           </a:xfrm>
           <a:prstGeom prst="rect">
             <a:avLst/>
@@ -3335,51 +3329,22 @@
               </a:lnSpc>
             </a:pPr>
             <a:r>
-              <a:rPr lang="en-US" sz="8001" spc="400">
+              <a:rPr lang="en-US" sz="6600" spc="400" err="1">
                 <a:solidFill>
                   <a:srgbClr val="2B4A9D"/>
                 </a:solidFill>
                 <a:latin typeface="Poppins Bold"/>
               </a:rPr>
-              <a:t>Layouts no Flutter</a:t>
-            </a:r>
-          </a:p>
-        </p:txBody>
-      </p:sp>
-      <p:sp>
-        <p:nvSpPr>
-          <p:cNvPr id="9" name="TextBox 9"/>
-          <p:cNvSpPr txBox="1"/>
-          <p:nvPr/>
-        </p:nvSpPr>
-        <p:spPr>
-          <a:xfrm>
-            <a:off x="785151" y="7260387"/>
-            <a:ext cx="12616379" cy="547370"/>
-          </a:xfrm>
-          <a:prstGeom prst="rect">
-            <a:avLst/>
-          </a:prstGeom>
-        </p:spPr>
-        <p:txBody>
-          <a:bodyPr lIns="0" tIns="0" rIns="0" bIns="0" rtlCol="0" anchor="t">
-            <a:spAutoFit/>
-          </a:bodyPr>
-          <a:lstStyle/>
-          <a:p>
-            <a:pPr>
-              <a:lnSpc>
-                <a:spcPts val="4480"/>
-              </a:lnSpc>
-            </a:pPr>
-            <a:r>
-              <a:rPr lang="en-US" sz="3200" spc="320">
-                <a:solidFill>
-                  <a:srgbClr val="000000"/>
-                </a:solidFill>
-                <a:latin typeface="Lato"/>
-              </a:rPr>
-              <a:t>Apresentado por: Eliane Dantas e Natalia Costa</a:t>
+              <a:t>Módulo</a:t>
+            </a:r>
+            <a:r>
+              <a:rPr lang="en-US" sz="6600" spc="400" dirty="0">
+                <a:solidFill>
+                  <a:srgbClr val="2B4A9D"/>
+                </a:solidFill>
+                <a:latin typeface="Poppins Bold"/>
+              </a:rPr>
+              <a:t> VI - Layouts no Flutter</a:t>
             </a:r>
           </a:p>
         </p:txBody>
@@ -3492,6 +3457,171 @@
           </p:spPr>
         </p:sp>
       </p:grpSp>
+      <p:sp>
+        <p:nvSpPr>
+          <p:cNvPr id="13" name="TextBox 9">
+            <a:extLst>
+              <a:ext uri="{FF2B5EF4-FFF2-40B4-BE49-F238E27FC236}">
+                <a16:creationId xmlns:a16="http://schemas.microsoft.com/office/drawing/2014/main" id="{50B0E3E9-8B64-8C41-6187-02BDB76E6FEE}"/>
+              </a:ext>
+            </a:extLst>
+          </p:cNvPr>
+          <p:cNvSpPr txBox="1"/>
+          <p:nvPr/>
+        </p:nvSpPr>
+        <p:spPr>
+          <a:xfrm>
+            <a:off x="814372" y="7555634"/>
+            <a:ext cx="12606221" cy="1256754"/>
+          </a:xfrm>
+          <a:prstGeom prst="rect">
+            <a:avLst/>
+          </a:prstGeom>
+        </p:spPr>
+        <p:txBody>
+          <a:bodyPr wrap="square" lIns="0" tIns="0" rIns="0" bIns="0" rtlCol="0" anchor="t">
+            <a:spAutoFit/>
+          </a:bodyPr>
+          <a:lstStyle>
+            <a:defPPr>
+              <a:defRPr lang="en-US"/>
+            </a:defPPr>
+            <a:lvl1pPr marL="0" algn="l" defTabSz="914400" rtl="0" eaLnBrk="1" latinLnBrk="0" hangingPunct="1">
+              <a:defRPr sz="1800" kern="1200">
+                <a:solidFill>
+                  <a:schemeClr val="tx1"/>
+                </a:solidFill>
+                <a:latin typeface="+mn-lt"/>
+                <a:ea typeface="+mn-ea"/>
+                <a:cs typeface="+mn-cs"/>
+              </a:defRPr>
+            </a:lvl1pPr>
+            <a:lvl2pPr marL="457200" algn="l" defTabSz="914400" rtl="0" eaLnBrk="1" latinLnBrk="0" hangingPunct="1">
+              <a:defRPr sz="1800" kern="1200">
+                <a:solidFill>
+                  <a:schemeClr val="tx1"/>
+                </a:solidFill>
+                <a:latin typeface="+mn-lt"/>
+                <a:ea typeface="+mn-ea"/>
+                <a:cs typeface="+mn-cs"/>
+              </a:defRPr>
+            </a:lvl2pPr>
+            <a:lvl3pPr marL="914400" algn="l" defTabSz="914400" rtl="0" eaLnBrk="1" latinLnBrk="0" hangingPunct="1">
+              <a:defRPr sz="1800" kern="1200">
+                <a:solidFill>
+                  <a:schemeClr val="tx1"/>
+                </a:solidFill>
+                <a:latin typeface="+mn-lt"/>
+                <a:ea typeface="+mn-ea"/>
+                <a:cs typeface="+mn-cs"/>
+              </a:defRPr>
+            </a:lvl3pPr>
+            <a:lvl4pPr marL="1371600" algn="l" defTabSz="914400" rtl="0" eaLnBrk="1" latinLnBrk="0" hangingPunct="1">
+              <a:defRPr sz="1800" kern="1200">
+                <a:solidFill>
+                  <a:schemeClr val="tx1"/>
+                </a:solidFill>
+                <a:latin typeface="+mn-lt"/>
+                <a:ea typeface="+mn-ea"/>
+                <a:cs typeface="+mn-cs"/>
+              </a:defRPr>
+            </a:lvl4pPr>
+            <a:lvl5pPr marL="1828800" algn="l" defTabSz="914400" rtl="0" eaLnBrk="1" latinLnBrk="0" hangingPunct="1">
+              <a:defRPr sz="1800" kern="1200">
+                <a:solidFill>
+                  <a:schemeClr val="tx1"/>
+                </a:solidFill>
+                <a:latin typeface="+mn-lt"/>
+                <a:ea typeface="+mn-ea"/>
+                <a:cs typeface="+mn-cs"/>
+              </a:defRPr>
+            </a:lvl5pPr>
+            <a:lvl6pPr marL="2286000" algn="l" defTabSz="914400" rtl="0" eaLnBrk="1" latinLnBrk="0" hangingPunct="1">
+              <a:defRPr sz="1800" kern="1200">
+                <a:solidFill>
+                  <a:schemeClr val="tx1"/>
+                </a:solidFill>
+                <a:latin typeface="+mn-lt"/>
+                <a:ea typeface="+mn-ea"/>
+                <a:cs typeface="+mn-cs"/>
+              </a:defRPr>
+            </a:lvl6pPr>
+            <a:lvl7pPr marL="2743200" algn="l" defTabSz="914400" rtl="0" eaLnBrk="1" latinLnBrk="0" hangingPunct="1">
+              <a:defRPr sz="1800" kern="1200">
+                <a:solidFill>
+                  <a:schemeClr val="tx1"/>
+                </a:solidFill>
+                <a:latin typeface="+mn-lt"/>
+                <a:ea typeface="+mn-ea"/>
+                <a:cs typeface="+mn-cs"/>
+              </a:defRPr>
+            </a:lvl7pPr>
+            <a:lvl8pPr marL="3200400" algn="l" defTabSz="914400" rtl="0" eaLnBrk="1" latinLnBrk="0" hangingPunct="1">
+              <a:defRPr sz="1800" kern="1200">
+                <a:solidFill>
+                  <a:schemeClr val="tx1"/>
+                </a:solidFill>
+                <a:latin typeface="+mn-lt"/>
+                <a:ea typeface="+mn-ea"/>
+                <a:cs typeface="+mn-cs"/>
+              </a:defRPr>
+            </a:lvl8pPr>
+            <a:lvl9pPr marL="3657600" algn="l" defTabSz="914400" rtl="0" eaLnBrk="1" latinLnBrk="0" hangingPunct="1">
+              <a:defRPr sz="1800" kern="1200">
+                <a:solidFill>
+                  <a:schemeClr val="tx1"/>
+                </a:solidFill>
+                <a:latin typeface="+mn-lt"/>
+                <a:ea typeface="+mn-ea"/>
+                <a:cs typeface="+mn-cs"/>
+              </a:defRPr>
+            </a:lvl9pPr>
+          </a:lstStyle>
+          <a:p>
+            <a:pPr>
+              <a:lnSpc>
+                <a:spcPts val="4900"/>
+              </a:lnSpc>
+            </a:pPr>
+            <a:r>
+              <a:rPr lang="en-US" sz="4500" spc="350" dirty="0" err="1">
+                <a:solidFill>
+                  <a:srgbClr val="000000"/>
+                </a:solidFill>
+                <a:latin typeface="Lato"/>
+              </a:rPr>
+              <a:t>Apresentado</a:t>
+            </a:r>
+            <a:r>
+              <a:rPr lang="en-US" sz="4500" spc="350" dirty="0">
+                <a:solidFill>
+                  <a:srgbClr val="000000"/>
+                </a:solidFill>
+                <a:latin typeface="Lato"/>
+              </a:rPr>
+              <a:t> </a:t>
+            </a:r>
+            <a:r>
+              <a:rPr lang="en-US" sz="4500" spc="350" dirty="0" err="1">
+                <a:solidFill>
+                  <a:srgbClr val="000000"/>
+                </a:solidFill>
+                <a:latin typeface="Lato"/>
+              </a:rPr>
+              <a:t>por</a:t>
+            </a:r>
+            <a:r>
+              <a:rPr lang="en-US" sz="4500" spc="350" dirty="0">
+                <a:solidFill>
+                  <a:srgbClr val="000000"/>
+                </a:solidFill>
+                <a:latin typeface="Lato"/>
+              </a:rPr>
+              <a:t>: Eliane Dantas e Natalia Costa</a:t>
+            </a:r>
+          </a:p>
+        </p:txBody>
+      </p:sp>
     </p:spTree>
   </p:cSld>
   <p:clrMapOvr>
@@ -4652,214 +4782,6 @@
           <a:chExt cx="0" cy="0"/>
         </a:xfrm>
       </p:grpSpPr>
-      <p:sp>
-        <p:nvSpPr>
-          <p:cNvPr id="2" name="TextBox 2"/>
-          <p:cNvSpPr txBox="1"/>
-          <p:nvPr/>
-        </p:nvSpPr>
-        <p:spPr>
-          <a:xfrm>
-            <a:off x="4716086" y="379832"/>
-            <a:ext cx="8855829" cy="895350"/>
-          </a:xfrm>
-          <a:prstGeom prst="rect">
-            <a:avLst/>
-          </a:prstGeom>
-        </p:spPr>
-        <p:txBody>
-          <a:bodyPr lIns="0" tIns="0" rIns="0" bIns="0" rtlCol="0" anchor="t">
-            <a:spAutoFit/>
-          </a:bodyPr>
-          <a:lstStyle/>
-          <a:p>
-            <a:pPr algn="ctr">
-              <a:lnSpc>
-                <a:spcPts val="6300"/>
-              </a:lnSpc>
-            </a:pPr>
-            <a:r>
-              <a:rPr lang="en-US" sz="6000" spc="300">
-                <a:solidFill>
-                  <a:srgbClr val="2B4A9D"/>
-                </a:solidFill>
-                <a:latin typeface="Poppins Ultra-Bold"/>
-              </a:rPr>
-              <a:t>Referências</a:t>
-            </a:r>
-          </a:p>
-        </p:txBody>
-      </p:sp>
-      <p:sp>
-        <p:nvSpPr>
-          <p:cNvPr id="3" name="TextBox 3"/>
-          <p:cNvSpPr txBox="1"/>
-          <p:nvPr/>
-        </p:nvSpPr>
-        <p:spPr>
-          <a:xfrm>
-            <a:off x="816673" y="1617218"/>
-            <a:ext cx="16442627" cy="6938264"/>
-          </a:xfrm>
-          <a:prstGeom prst="rect">
-            <a:avLst/>
-          </a:prstGeom>
-        </p:spPr>
-        <p:txBody>
-          <a:bodyPr lIns="0" tIns="0" rIns="0" bIns="0" rtlCol="0" anchor="t">
-            <a:spAutoFit/>
-          </a:bodyPr>
-          <a:lstStyle/>
-          <a:p>
-            <a:pPr algn="just">
-              <a:lnSpc>
-                <a:spcPts val="4227"/>
-              </a:lnSpc>
-            </a:pPr>
-            <a:r>
-              <a:rPr lang="en-US" sz="2799" spc="139">
-                <a:solidFill>
-                  <a:srgbClr val="000000"/>
-                </a:solidFill>
-                <a:latin typeface="Poppins"/>
-              </a:rPr>
-              <a:t>DIAS, R.</a:t>
-            </a:r>
-            <a:r>
-              <a:rPr lang="en-US" sz="2799" spc="139">
-                <a:solidFill>
-                  <a:srgbClr val="000000"/>
-                </a:solidFill>
-                <a:latin typeface="Poppins Bold"/>
-              </a:rPr>
-              <a:t> Flutter: Criando layouts com Center, Column e Row.</a:t>
-            </a:r>
-            <a:r>
-              <a:rPr lang="en-US" sz="2799" spc="139">
-                <a:solidFill>
-                  <a:srgbClr val="000000"/>
-                </a:solidFill>
-                <a:latin typeface="Poppins"/>
-              </a:rPr>
-              <a:t> Disponível em: &lt;https://www.devmedia.com.br/flutter-criando-layouts-com-center-column-e-row/40743&gt;. Acesso em: 7 mar. 2024.</a:t>
-            </a:r>
-          </a:p>
-          <a:p>
-            <a:pPr algn="just">
-              <a:lnSpc>
-                <a:spcPts val="4227"/>
-              </a:lnSpc>
-            </a:pPr>
-            <a:endParaRPr lang="en-US" sz="2799" spc="139">
-              <a:solidFill>
-                <a:srgbClr val="000000"/>
-              </a:solidFill>
-              <a:latin typeface="Poppins"/>
-            </a:endParaRPr>
-          </a:p>
-          <a:p>
-            <a:pPr algn="just">
-              <a:lnSpc>
-                <a:spcPts val="4227"/>
-              </a:lnSpc>
-            </a:pPr>
-            <a:r>
-              <a:rPr lang="en-US" sz="2799" spc="139">
-                <a:solidFill>
-                  <a:srgbClr val="000000"/>
-                </a:solidFill>
-                <a:latin typeface="Poppins Bold"/>
-              </a:rPr>
-              <a:t>Classe de contêiner em Flutter – Acervo Lima.</a:t>
-            </a:r>
-            <a:r>
-              <a:rPr lang="en-US" sz="2799" spc="139">
-                <a:solidFill>
-                  <a:srgbClr val="000000"/>
-                </a:solidFill>
-                <a:latin typeface="Poppins"/>
-              </a:rPr>
-              <a:t> Disponível em: &lt;https://acervolima.com/classe-de-conteiner-em-flutter/&gt;. Acesso em: 7 mar. 2024.</a:t>
-            </a:r>
-          </a:p>
-          <a:p>
-            <a:pPr algn="just">
-              <a:lnSpc>
-                <a:spcPts val="4227"/>
-              </a:lnSpc>
-            </a:pPr>
-            <a:endParaRPr lang="en-US" sz="2799" spc="139">
-              <a:solidFill>
-                <a:srgbClr val="000000"/>
-              </a:solidFill>
-              <a:latin typeface="Poppins"/>
-            </a:endParaRPr>
-          </a:p>
-          <a:p>
-            <a:pPr algn="just">
-              <a:lnSpc>
-                <a:spcPts val="4227"/>
-              </a:lnSpc>
-            </a:pPr>
-            <a:r>
-              <a:rPr lang="en-US" sz="2799" spc="139">
-                <a:solidFill>
-                  <a:srgbClr val="000000"/>
-                </a:solidFill>
-                <a:latin typeface="Poppins Bold"/>
-              </a:rPr>
-              <a:t>Building user interfaces with Flutter.</a:t>
-            </a:r>
-            <a:r>
-              <a:rPr lang="en-US" sz="2799" spc="139">
-                <a:solidFill>
-                  <a:srgbClr val="000000"/>
-                </a:solidFill>
-                <a:latin typeface="Poppins"/>
-              </a:rPr>
-              <a:t> Disponível em: &lt;https://docs.flutter.dev/ui&gt;. Acesso em: 7 mar. 2024.</a:t>
-            </a:r>
-          </a:p>
-          <a:p>
-            <a:pPr algn="just">
-              <a:lnSpc>
-                <a:spcPts val="4227"/>
-              </a:lnSpc>
-            </a:pPr>
-            <a:endParaRPr lang="en-US" sz="2799" spc="139">
-              <a:solidFill>
-                <a:srgbClr val="000000"/>
-              </a:solidFill>
-              <a:latin typeface="Poppins"/>
-            </a:endParaRPr>
-          </a:p>
-          <a:p>
-            <a:pPr algn="just">
-              <a:lnSpc>
-                <a:spcPts val="4227"/>
-              </a:lnSpc>
-            </a:pPr>
-            <a:r>
-              <a:rPr lang="en-US" sz="2799" spc="139">
-                <a:solidFill>
-                  <a:srgbClr val="000000"/>
-                </a:solidFill>
-                <a:latin typeface="Poppins Bold"/>
-              </a:rPr>
-              <a:t>Flutter Container.</a:t>
-            </a:r>
-            <a:r>
-              <a:rPr lang="en-US" sz="2799" spc="139">
-                <a:solidFill>
-                  <a:srgbClr val="000000"/>
-                </a:solidFill>
-                <a:latin typeface="Poppins"/>
-              </a:rPr>
-              <a:t> Disponível em: &lt;https://www.darttutorial.org/flutter-tutorial/flutter-container/&gt;. Acesso em: 8 mar. 2024.</a:t>
-            </a:r>
-          </a:p>
-        </p:txBody>
-      </p:sp>
       <p:grpSp>
         <p:nvGrpSpPr>
           <p:cNvPr id="4" name="Group 4"/>
@@ -4915,6 +4837,265 @@
           </p:spPr>
         </p:sp>
       </p:grpSp>
+      <p:sp>
+        <p:nvSpPr>
+          <p:cNvPr id="6" name="TextBox 2">
+            <a:extLst>
+              <a:ext uri="{FF2B5EF4-FFF2-40B4-BE49-F238E27FC236}">
+                <a16:creationId xmlns:a16="http://schemas.microsoft.com/office/drawing/2014/main" id="{BD9280AC-5190-94BC-62D2-4509AF886A60}"/>
+              </a:ext>
+            </a:extLst>
+          </p:cNvPr>
+          <p:cNvSpPr txBox="1"/>
+          <p:nvPr/>
+        </p:nvSpPr>
+        <p:spPr>
+          <a:xfrm>
+            <a:off x="818474" y="3439714"/>
+            <a:ext cx="16698025" cy="2199320"/>
+          </a:xfrm>
+          <a:prstGeom prst="rect">
+            <a:avLst/>
+          </a:prstGeom>
+        </p:spPr>
+        <p:txBody>
+          <a:bodyPr wrap="square" lIns="0" tIns="0" rIns="0" bIns="0" rtlCol="0" anchor="t">
+            <a:spAutoFit/>
+          </a:bodyPr>
+          <a:lstStyle>
+            <a:defPPr>
+              <a:defRPr lang="en-US"/>
+            </a:defPPr>
+            <a:lvl1pPr marL="0" algn="l" defTabSz="914400" rtl="0" eaLnBrk="1" latinLnBrk="0" hangingPunct="1">
+              <a:defRPr sz="1800" kern="1200">
+                <a:solidFill>
+                  <a:schemeClr val="tx1"/>
+                </a:solidFill>
+                <a:latin typeface="+mn-lt"/>
+                <a:ea typeface="+mn-ea"/>
+                <a:cs typeface="+mn-cs"/>
+              </a:defRPr>
+            </a:lvl1pPr>
+            <a:lvl2pPr marL="457200" algn="l" defTabSz="914400" rtl="0" eaLnBrk="1" latinLnBrk="0" hangingPunct="1">
+              <a:defRPr sz="1800" kern="1200">
+                <a:solidFill>
+                  <a:schemeClr val="tx1"/>
+                </a:solidFill>
+                <a:latin typeface="+mn-lt"/>
+                <a:ea typeface="+mn-ea"/>
+                <a:cs typeface="+mn-cs"/>
+              </a:defRPr>
+            </a:lvl2pPr>
+            <a:lvl3pPr marL="914400" algn="l" defTabSz="914400" rtl="0" eaLnBrk="1" latinLnBrk="0" hangingPunct="1">
+              <a:defRPr sz="1800" kern="1200">
+                <a:solidFill>
+                  <a:schemeClr val="tx1"/>
+                </a:solidFill>
+                <a:latin typeface="+mn-lt"/>
+                <a:ea typeface="+mn-ea"/>
+                <a:cs typeface="+mn-cs"/>
+              </a:defRPr>
+            </a:lvl3pPr>
+            <a:lvl4pPr marL="1371600" algn="l" defTabSz="914400" rtl="0" eaLnBrk="1" latinLnBrk="0" hangingPunct="1">
+              <a:defRPr sz="1800" kern="1200">
+                <a:solidFill>
+                  <a:schemeClr val="tx1"/>
+                </a:solidFill>
+                <a:latin typeface="+mn-lt"/>
+                <a:ea typeface="+mn-ea"/>
+                <a:cs typeface="+mn-cs"/>
+              </a:defRPr>
+            </a:lvl4pPr>
+            <a:lvl5pPr marL="1828800" algn="l" defTabSz="914400" rtl="0" eaLnBrk="1" latinLnBrk="0" hangingPunct="1">
+              <a:defRPr sz="1800" kern="1200">
+                <a:solidFill>
+                  <a:schemeClr val="tx1"/>
+                </a:solidFill>
+                <a:latin typeface="+mn-lt"/>
+                <a:ea typeface="+mn-ea"/>
+                <a:cs typeface="+mn-cs"/>
+              </a:defRPr>
+            </a:lvl5pPr>
+            <a:lvl6pPr marL="2286000" algn="l" defTabSz="914400" rtl="0" eaLnBrk="1" latinLnBrk="0" hangingPunct="1">
+              <a:defRPr sz="1800" kern="1200">
+                <a:solidFill>
+                  <a:schemeClr val="tx1"/>
+                </a:solidFill>
+                <a:latin typeface="+mn-lt"/>
+                <a:ea typeface="+mn-ea"/>
+                <a:cs typeface="+mn-cs"/>
+              </a:defRPr>
+            </a:lvl6pPr>
+            <a:lvl7pPr marL="2743200" algn="l" defTabSz="914400" rtl="0" eaLnBrk="1" latinLnBrk="0" hangingPunct="1">
+              <a:defRPr sz="1800" kern="1200">
+                <a:solidFill>
+                  <a:schemeClr val="tx1"/>
+                </a:solidFill>
+                <a:latin typeface="+mn-lt"/>
+                <a:ea typeface="+mn-ea"/>
+                <a:cs typeface="+mn-cs"/>
+              </a:defRPr>
+            </a:lvl7pPr>
+            <a:lvl8pPr marL="3200400" algn="l" defTabSz="914400" rtl="0" eaLnBrk="1" latinLnBrk="0" hangingPunct="1">
+              <a:defRPr sz="1800" kern="1200">
+                <a:solidFill>
+                  <a:schemeClr val="tx1"/>
+                </a:solidFill>
+                <a:latin typeface="+mn-lt"/>
+                <a:ea typeface="+mn-ea"/>
+                <a:cs typeface="+mn-cs"/>
+              </a:defRPr>
+            </a:lvl8pPr>
+            <a:lvl9pPr marL="3657600" algn="l" defTabSz="914400" rtl="0" eaLnBrk="1" latinLnBrk="0" hangingPunct="1">
+              <a:defRPr sz="1800" kern="1200">
+                <a:solidFill>
+                  <a:schemeClr val="tx1"/>
+                </a:solidFill>
+                <a:latin typeface="+mn-lt"/>
+                <a:ea typeface="+mn-ea"/>
+                <a:cs typeface="+mn-cs"/>
+              </a:defRPr>
+            </a:lvl9pPr>
+          </a:lstStyle>
+          <a:p>
+            <a:pPr algn="ctr">
+              <a:lnSpc>
+                <a:spcPct val="150000"/>
+              </a:lnSpc>
+            </a:pPr>
+            <a:r>
+              <a:rPr lang="en-US" sz="5000" spc="313" dirty="0">
+                <a:solidFill>
+                  <a:srgbClr val="2B4A9D"/>
+                </a:solidFill>
+                <a:latin typeface="Poppins Bold"/>
+                <a:cs typeface="Poppins Bold"/>
+              </a:rPr>
+              <a:t>No </a:t>
+            </a:r>
+            <a:r>
+              <a:rPr lang="en-US" sz="5000" b="1" spc="313" dirty="0" err="1">
+                <a:solidFill>
+                  <a:srgbClr val="2B4A9D"/>
+                </a:solidFill>
+                <a:latin typeface="Poppins Bold"/>
+                <a:cs typeface="Poppins Bold"/>
+              </a:rPr>
+              <a:t>próximo</a:t>
+            </a:r>
+            <a:r>
+              <a:rPr lang="en-US" sz="5000" b="1" spc="313" dirty="0">
+                <a:solidFill>
+                  <a:srgbClr val="2B4A9D"/>
+                </a:solidFill>
+                <a:latin typeface="Poppins Bold"/>
+                <a:cs typeface="Poppins Bold"/>
+              </a:rPr>
+              <a:t> </a:t>
+            </a:r>
+            <a:r>
+              <a:rPr lang="en-US" sz="5000" b="1" spc="313" dirty="0" err="1">
+                <a:solidFill>
+                  <a:srgbClr val="2B4A9D"/>
+                </a:solidFill>
+                <a:latin typeface="Poppins Bold"/>
+                <a:cs typeface="Poppins Bold"/>
+              </a:rPr>
+              <a:t>módulo</a:t>
+            </a:r>
+            <a:r>
+              <a:rPr lang="en-US" sz="5000" b="1" spc="313" dirty="0">
+                <a:solidFill>
+                  <a:srgbClr val="2B4A9D"/>
+                </a:solidFill>
+                <a:latin typeface="Poppins Bold"/>
+                <a:cs typeface="Poppins Bold"/>
+              </a:rPr>
+              <a:t> </a:t>
+            </a:r>
+            <a:r>
+              <a:rPr lang="en-US" sz="5000" spc="313" dirty="0" err="1">
+                <a:solidFill>
+                  <a:srgbClr val="2B4A9D"/>
+                </a:solidFill>
+                <a:latin typeface="Poppins Bold"/>
+                <a:cs typeface="Poppins Bold"/>
+              </a:rPr>
+              <a:t>veremos</a:t>
+            </a:r>
+            <a:r>
+              <a:rPr lang="en-US" sz="5000" spc="313" dirty="0">
+                <a:solidFill>
+                  <a:srgbClr val="2B4A9D"/>
+                </a:solidFill>
+                <a:latin typeface="Poppins Bold"/>
+                <a:cs typeface="Poppins Bold"/>
+              </a:rPr>
+              <a:t> </a:t>
+            </a:r>
+            <a:r>
+              <a:rPr lang="en-US" sz="5000" spc="313" dirty="0" err="1">
+                <a:solidFill>
+                  <a:srgbClr val="2B4A9D"/>
+                </a:solidFill>
+                <a:latin typeface="Poppins Bold"/>
+                <a:cs typeface="Poppins Bold"/>
+              </a:rPr>
+              <a:t>como</a:t>
+            </a:r>
+            <a:r>
+              <a:rPr lang="en-US" sz="5000" spc="313" dirty="0">
+                <a:solidFill>
+                  <a:srgbClr val="2B4A9D"/>
+                </a:solidFill>
+                <a:latin typeface="Poppins Bold"/>
+                <a:cs typeface="Poppins Bold"/>
+              </a:rPr>
+              <a:t> </a:t>
+            </a:r>
+            <a:r>
+              <a:rPr lang="en-US" sz="5000" spc="313" dirty="0" err="1">
+                <a:solidFill>
+                  <a:srgbClr val="2B4A9D"/>
+                </a:solidFill>
+                <a:latin typeface="Poppins Bold"/>
+                <a:cs typeface="Poppins Bold"/>
+              </a:rPr>
+              <a:t>funciona</a:t>
+            </a:r>
+            <a:r>
+              <a:rPr lang="en-US" sz="5000" spc="313" dirty="0">
+                <a:solidFill>
+                  <a:srgbClr val="2B4A9D"/>
+                </a:solidFill>
+                <a:latin typeface="Poppins Bold"/>
+                <a:cs typeface="Poppins Bold"/>
+              </a:rPr>
+              <a:t> a </a:t>
+            </a:r>
+            <a:r>
+              <a:rPr lang="en-US" sz="5000" spc="313" dirty="0" err="1">
+                <a:solidFill>
+                  <a:srgbClr val="2B4A9D"/>
+                </a:solidFill>
+                <a:latin typeface="Poppins Bold"/>
+                <a:cs typeface="Poppins Bold"/>
+              </a:rPr>
+              <a:t>criação</a:t>
+            </a:r>
+            <a:r>
+              <a:rPr lang="en-US" sz="5000" spc="313" dirty="0">
+                <a:solidFill>
+                  <a:srgbClr val="2B4A9D"/>
+                </a:solidFill>
+                <a:latin typeface="Poppins Bold"/>
+                <a:cs typeface="Poppins Bold"/>
+              </a:rPr>
+              <a:t> de menus.</a:t>
+            </a:r>
+          </a:p>
+        </p:txBody>
+      </p:sp>
     </p:spTree>
   </p:cSld>
   <p:clrMapOvr>

</xml_diff>